<commit_message>
lecture materials and assignment
</commit_message>
<xml_diff>
--- a/lectures/01 - API Design Part I.pptx
+++ b/lectures/01 - API Design Part I.pptx
@@ -136,12 +136,20 @@
 </p:presentation>
 </file>
 
+<file path=ppt/revisionInfo.xml><?xml version="1.0" encoding="utf-8"?>
+<p1510:revInfo xmlns:a="http://schemas.openxmlformats.org/drawingml/2006/main" xmlns:r="http://schemas.openxmlformats.org/officeDocument/2006/relationships" xmlns:p1510="http://schemas.microsoft.com/office/powerpoint/2015/10/main">
+  <p1510:revLst>
+    <p1510:client id="{71702230-237B-C547-94B7-F57CE128C28E}" v="4" dt="2020-01-09T22:36:42.898"/>
+  </p1510:revLst>
+</p1510:revInfo>
+</file>
+
 <file path=ppt/changesInfos/changesInfo1.xml><?xml version="1.0" encoding="utf-8"?>
 <pc:chgInfo xmlns:a="http://schemas.openxmlformats.org/drawingml/2006/main" xmlns:r="http://schemas.openxmlformats.org/officeDocument/2006/relationships" xmlns:ac="http://schemas.microsoft.com/office/drawing/2013/main/command" xmlns:pc="http://schemas.microsoft.com/office/powerpoint/2013/main/command">
   <pc:docChgLst>
     <pc:chgData name="Michaeljon Miller" userId="c575fe5cddd8b8cf" providerId="LiveId" clId="{71702230-237B-C547-94B7-F57CE128C28E}"/>
-    <pc:docChg chg="delSld">
-      <pc:chgData name="Michaeljon Miller" userId="c575fe5cddd8b8cf" providerId="LiveId" clId="{71702230-237B-C547-94B7-F57CE128C28E}" dt="2019-12-31T17:24:23.574" v="6" actId="2696"/>
+    <pc:docChg chg="undo custSel delSld modSld">
+      <pc:chgData name="Michaeljon Miller" userId="c575fe5cddd8b8cf" providerId="LiveId" clId="{71702230-237B-C547-94B7-F57CE128C28E}" dt="2020-01-09T22:39:19.011" v="175" actId="20577"/>
       <pc:docMkLst>
         <pc:docMk/>
       </pc:docMkLst>
@@ -172,6 +180,81 @@
           <pc:docMk/>
           <pc:sldMk cId="1061619602" sldId="264"/>
         </pc:sldMkLst>
+      </pc:sldChg>
+      <pc:sldChg chg="modSp">
+        <pc:chgData name="Michaeljon Miller" userId="c575fe5cddd8b8cf" providerId="LiveId" clId="{71702230-237B-C547-94B7-F57CE128C28E}" dt="2020-01-09T22:35:33.066" v="18" actId="20577"/>
+        <pc:sldMkLst>
+          <pc:docMk/>
+          <pc:sldMk cId="3190887682" sldId="269"/>
+        </pc:sldMkLst>
+        <pc:spChg chg="mod">
+          <ac:chgData name="Michaeljon Miller" userId="c575fe5cddd8b8cf" providerId="LiveId" clId="{71702230-237B-C547-94B7-F57CE128C28E}" dt="2020-01-09T22:35:33.066" v="18" actId="20577"/>
+          <ac:spMkLst>
+            <pc:docMk/>
+            <pc:sldMk cId="3190887682" sldId="269"/>
+            <ac:spMk id="3" creationId="{00000000-0000-0000-0000-000000000000}"/>
+          </ac:spMkLst>
+        </pc:spChg>
+      </pc:sldChg>
+      <pc:sldChg chg="modSp">
+        <pc:chgData name="Michaeljon Miller" userId="c575fe5cddd8b8cf" providerId="LiveId" clId="{71702230-237B-C547-94B7-F57CE128C28E}" dt="2020-01-09T22:36:06.669" v="60" actId="20577"/>
+        <pc:sldMkLst>
+          <pc:docMk/>
+          <pc:sldMk cId="2869546175" sldId="271"/>
+        </pc:sldMkLst>
+        <pc:spChg chg="mod">
+          <ac:chgData name="Michaeljon Miller" userId="c575fe5cddd8b8cf" providerId="LiveId" clId="{71702230-237B-C547-94B7-F57CE128C28E}" dt="2020-01-09T22:36:06.669" v="60" actId="20577"/>
+          <ac:spMkLst>
+            <pc:docMk/>
+            <pc:sldMk cId="2869546175" sldId="271"/>
+            <ac:spMk id="3" creationId="{00000000-0000-0000-0000-000000000000}"/>
+          </ac:spMkLst>
+        </pc:spChg>
+      </pc:sldChg>
+      <pc:sldChg chg="modSp">
+        <pc:chgData name="Michaeljon Miller" userId="c575fe5cddd8b8cf" providerId="LiveId" clId="{71702230-237B-C547-94B7-F57CE128C28E}" dt="2020-01-09T22:36:33.872" v="62"/>
+        <pc:sldMkLst>
+          <pc:docMk/>
+          <pc:sldMk cId="4173387167" sldId="272"/>
+        </pc:sldMkLst>
+        <pc:spChg chg="mod">
+          <ac:chgData name="Michaeljon Miller" userId="c575fe5cddd8b8cf" providerId="LiveId" clId="{71702230-237B-C547-94B7-F57CE128C28E}" dt="2020-01-09T22:36:33.872" v="62"/>
+          <ac:spMkLst>
+            <pc:docMk/>
+            <pc:sldMk cId="4173387167" sldId="272"/>
+            <ac:spMk id="3" creationId="{00000000-0000-0000-0000-000000000000}"/>
+          </ac:spMkLst>
+        </pc:spChg>
+      </pc:sldChg>
+      <pc:sldChg chg="modSp">
+        <pc:chgData name="Michaeljon Miller" userId="c575fe5cddd8b8cf" providerId="LiveId" clId="{71702230-237B-C547-94B7-F57CE128C28E}" dt="2020-01-09T22:36:42.898" v="64"/>
+        <pc:sldMkLst>
+          <pc:docMk/>
+          <pc:sldMk cId="4261719987" sldId="273"/>
+        </pc:sldMkLst>
+        <pc:spChg chg="mod">
+          <ac:chgData name="Michaeljon Miller" userId="c575fe5cddd8b8cf" providerId="LiveId" clId="{71702230-237B-C547-94B7-F57CE128C28E}" dt="2020-01-09T22:36:42.898" v="64"/>
+          <ac:spMkLst>
+            <pc:docMk/>
+            <pc:sldMk cId="4261719987" sldId="273"/>
+            <ac:spMk id="3" creationId="{00000000-0000-0000-0000-000000000000}"/>
+          </ac:spMkLst>
+        </pc:spChg>
+      </pc:sldChg>
+      <pc:sldChg chg="modSp">
+        <pc:chgData name="Michaeljon Miller" userId="c575fe5cddd8b8cf" providerId="LiveId" clId="{71702230-237B-C547-94B7-F57CE128C28E}" dt="2020-01-09T22:39:19.011" v="175" actId="20577"/>
+        <pc:sldMkLst>
+          <pc:docMk/>
+          <pc:sldMk cId="3973889465" sldId="317"/>
+        </pc:sldMkLst>
+        <pc:spChg chg="mod">
+          <ac:chgData name="Michaeljon Miller" userId="c575fe5cddd8b8cf" providerId="LiveId" clId="{71702230-237B-C547-94B7-F57CE128C28E}" dt="2020-01-09T22:39:19.011" v="175" actId="20577"/>
+          <ac:spMkLst>
+            <pc:docMk/>
+            <pc:sldMk cId="3973889465" sldId="317"/>
+            <ac:spMk id="3" creationId="{394085AC-9B66-EE47-A0D8-750E2075F903}"/>
+          </ac:spMkLst>
+        </pc:spChg>
       </pc:sldChg>
       <pc:sldChg chg="del">
         <pc:chgData name="Michaeljon Miller" userId="c575fe5cddd8b8cf" providerId="LiveId" clId="{71702230-237B-C547-94B7-F57CE128C28E}" dt="2019-12-31T17:24:23.574" v="6" actId="2696"/>
@@ -655,7 +738,7 @@
           <a:p>
             <a:fld id="{B30C5654-8255-4741-B5E4-F40A45C3546B}" type="datetimeFigureOut">
               <a:rPr lang="en-US" smtClean="0"/>
-              <a:t>12/31/19</a:t>
+              <a:t>1/9/20</a:t>
             </a:fld>
             <a:endParaRPr lang="en-US"/>
           </a:p>
@@ -1135,7 +1218,7 @@
           <a:p>
             <a:fld id="{1E1327A7-1338-42E3-A376-4DBDA53A9DB0}" type="datetimeFigureOut">
               <a:rPr lang="en-US" smtClean="0"/>
-              <a:t>12/31/19</a:t>
+              <a:t>1/9/20</a:t>
             </a:fld>
             <a:endParaRPr lang="en-US"/>
           </a:p>
@@ -1303,7 +1386,7 @@
           <a:p>
             <a:fld id="{1E1327A7-1338-42E3-A376-4DBDA53A9DB0}" type="datetimeFigureOut">
               <a:rPr lang="en-US" smtClean="0"/>
-              <a:t>12/31/19</a:t>
+              <a:t>1/9/20</a:t>
             </a:fld>
             <a:endParaRPr lang="en-US"/>
           </a:p>
@@ -1481,7 +1564,7 @@
           <a:p>
             <a:fld id="{1E1327A7-1338-42E3-A376-4DBDA53A9DB0}" type="datetimeFigureOut">
               <a:rPr lang="en-US" smtClean="0"/>
-              <a:t>12/31/19</a:t>
+              <a:t>1/9/20</a:t>
             </a:fld>
             <a:endParaRPr lang="en-US"/>
           </a:p>
@@ -1649,7 +1732,7 @@
           <a:p>
             <a:fld id="{1E1327A7-1338-42E3-A376-4DBDA53A9DB0}" type="datetimeFigureOut">
               <a:rPr lang="en-US" smtClean="0"/>
-              <a:t>12/31/19</a:t>
+              <a:t>1/9/20</a:t>
             </a:fld>
             <a:endParaRPr lang="en-US"/>
           </a:p>
@@ -1894,7 +1977,7 @@
           <a:p>
             <a:fld id="{1E1327A7-1338-42E3-A376-4DBDA53A9DB0}" type="datetimeFigureOut">
               <a:rPr lang="en-US" smtClean="0"/>
-              <a:t>12/31/19</a:t>
+              <a:t>1/9/20</a:t>
             </a:fld>
             <a:endParaRPr lang="en-US"/>
           </a:p>
@@ -2123,7 +2206,7 @@
           <a:p>
             <a:fld id="{1E1327A7-1338-42E3-A376-4DBDA53A9DB0}" type="datetimeFigureOut">
               <a:rPr lang="en-US" smtClean="0"/>
-              <a:t>12/31/19</a:t>
+              <a:t>1/9/20</a:t>
             </a:fld>
             <a:endParaRPr lang="en-US"/>
           </a:p>
@@ -2487,7 +2570,7 @@
           <a:p>
             <a:fld id="{1E1327A7-1338-42E3-A376-4DBDA53A9DB0}" type="datetimeFigureOut">
               <a:rPr lang="en-US" smtClean="0"/>
-              <a:t>12/31/19</a:t>
+              <a:t>1/9/20</a:t>
             </a:fld>
             <a:endParaRPr lang="en-US"/>
           </a:p>
@@ -2604,7 +2687,7 @@
           <a:p>
             <a:fld id="{1E1327A7-1338-42E3-A376-4DBDA53A9DB0}" type="datetimeFigureOut">
               <a:rPr lang="en-US" smtClean="0"/>
-              <a:t>12/31/19</a:t>
+              <a:t>1/9/20</a:t>
             </a:fld>
             <a:endParaRPr lang="en-US"/>
           </a:p>
@@ -2699,7 +2782,7 @@
           <a:p>
             <a:fld id="{1E1327A7-1338-42E3-A376-4DBDA53A9DB0}" type="datetimeFigureOut">
               <a:rPr lang="en-US" smtClean="0"/>
-              <a:t>12/31/19</a:t>
+              <a:t>1/9/20</a:t>
             </a:fld>
             <a:endParaRPr lang="en-US"/>
           </a:p>
@@ -2974,7 +3057,7 @@
           <a:p>
             <a:fld id="{1E1327A7-1338-42E3-A376-4DBDA53A9DB0}" type="datetimeFigureOut">
               <a:rPr lang="en-US" smtClean="0"/>
-              <a:t>12/31/19</a:t>
+              <a:t>1/9/20</a:t>
             </a:fld>
             <a:endParaRPr lang="en-US"/>
           </a:p>
@@ -3226,7 +3309,7 @@
           <a:p>
             <a:fld id="{1E1327A7-1338-42E3-A376-4DBDA53A9DB0}" type="datetimeFigureOut">
               <a:rPr lang="en-US" smtClean="0"/>
-              <a:t>12/31/19</a:t>
+              <a:t>1/9/20</a:t>
             </a:fld>
             <a:endParaRPr lang="en-US"/>
           </a:p>
@@ -3437,7 +3520,7 @@
           <a:p>
             <a:fld id="{1E1327A7-1338-42E3-A376-4DBDA53A9DB0}" type="datetimeFigureOut">
               <a:rPr lang="en-US" smtClean="0"/>
-              <a:t>12/31/19</a:t>
+              <a:t>1/9/20</a:t>
             </a:fld>
             <a:endParaRPr lang="en-US"/>
           </a:p>
@@ -3967,7 +4050,7 @@
         </p:spPr>
         <p:txBody>
           <a:bodyPr>
-            <a:normAutofit fontScale="85000" lnSpcReduction="20000"/>
+            <a:normAutofit/>
           </a:bodyPr>
           <a:lstStyle/>
           <a:p>
@@ -4024,27 +4107,7 @@
                 <a:latin typeface="Consolas" panose="020B0609020204030204" pitchFamily="49" charset="0"/>
                 <a:cs typeface="Consolas" panose="020B0609020204030204" pitchFamily="49" charset="0"/>
               </a:rPr>
-              <a:t>  "id": { </a:t>
-            </a:r>
-          </a:p>
-          <a:p>
-            <a:pPr marL="0" indent="0">
-              <a:buNone/>
-            </a:pPr>
-            <a:r>
-              <a:rPr lang="en-US" dirty="0">
-                <a:ln>
-                  <a:solidFill>
-                    <a:srgbClr val="00B050"/>
-                  </a:solidFill>
-                </a:ln>
-                <a:solidFill>
-                  <a:srgbClr val="00B050"/>
-                </a:solidFill>
-                <a:latin typeface="Consolas" panose="020B0609020204030204" pitchFamily="49" charset="0"/>
-                <a:cs typeface="Consolas" panose="020B0609020204030204" pitchFamily="49" charset="0"/>
-              </a:rPr>
-              <a:t>      "area": "</a:t>
+              <a:t>  "id": "&lt;</a:t>
             </a:r>
             <a:r>
               <a:rPr lang="en-US" dirty="0" err="1">
@@ -4059,82 +4122,22 @@
                 <a:latin typeface="Consolas" panose="020B0609020204030204" pitchFamily="49" charset="0"/>
                 <a:cs typeface="Consolas" panose="020B0609020204030204" pitchFamily="49" charset="0"/>
               </a:rPr>
-              <a:t>dat</a:t>
-            </a:r>
-            <a:r>
-              <a:rPr lang="en-US" dirty="0">
-                <a:ln>
-                  <a:solidFill>
-                    <a:srgbClr val="00B050"/>
-                  </a:solidFill>
-                </a:ln>
-                <a:solidFill>
-                  <a:srgbClr val="00B050"/>
-                </a:solidFill>
-                <a:latin typeface="Consolas" panose="020B0609020204030204" pitchFamily="49" charset="0"/>
-                <a:cs typeface="Consolas" panose="020B0609020204030204" pitchFamily="49" charset="0"/>
-              </a:rPr>
-              <a:t>", </a:t>
-            </a:r>
-          </a:p>
-          <a:p>
-            <a:pPr marL="0" indent="0">
-              <a:buNone/>
-            </a:pPr>
-            <a:r>
-              <a:rPr lang="en-US" dirty="0">
-                <a:ln>
-                  <a:solidFill>
-                    <a:srgbClr val="00B050"/>
-                  </a:solidFill>
-                </a:ln>
-                <a:solidFill>
-                  <a:srgbClr val="00B050"/>
-                </a:solidFill>
-                <a:latin typeface="Consolas" panose="020B0609020204030204" pitchFamily="49" charset="0"/>
-                <a:cs typeface="Consolas" panose="020B0609020204030204" pitchFamily="49" charset="0"/>
-              </a:rPr>
-              <a:t>      "number": "4035447427", </a:t>
-            </a:r>
-          </a:p>
-          <a:p>
-            <a:pPr marL="0" indent="0">
-              <a:buNone/>
-            </a:pPr>
-            <a:r>
-              <a:rPr lang="en-US" dirty="0">
-                <a:ln>
-                  <a:solidFill>
-                    <a:srgbClr val="00B050"/>
-                  </a:solidFill>
-                </a:ln>
-                <a:solidFill>
-                  <a:srgbClr val="00B050"/>
-                </a:solidFill>
-                <a:latin typeface="Consolas" panose="020B0609020204030204" pitchFamily="49" charset="0"/>
-                <a:cs typeface="Consolas" panose="020B0609020204030204" pitchFamily="49" charset="0"/>
-              </a:rPr>
-              <a:t>      "value": "dat-4035447427“ </a:t>
-            </a:r>
-          </a:p>
-          <a:p>
-            <a:pPr marL="0" indent="0">
-              <a:buNone/>
-            </a:pPr>
-            <a:r>
-              <a:rPr lang="en-US" dirty="0">
-                <a:ln>
-                  <a:solidFill>
-                    <a:srgbClr val="00B050"/>
-                  </a:solidFill>
-                </a:ln>
-                <a:solidFill>
-                  <a:srgbClr val="00B050"/>
-                </a:solidFill>
-                <a:latin typeface="Consolas" panose="020B0609020204030204" pitchFamily="49" charset="0"/>
-                <a:cs typeface="Consolas" panose="020B0609020204030204" pitchFamily="49" charset="0"/>
-              </a:rPr>
-              <a:t>    },</a:t>
+              <a:t>guid</a:t>
+            </a:r>
+            <a:r>
+              <a:rPr lang="en-US" dirty="0">
+                <a:ln>
+                  <a:solidFill>
+                    <a:srgbClr val="00B050"/>
+                  </a:solidFill>
+                </a:ln>
+                <a:solidFill>
+                  <a:srgbClr val="00B050"/>
+                </a:solidFill>
+                <a:latin typeface="Consolas" panose="020B0609020204030204" pitchFamily="49" charset="0"/>
+                <a:cs typeface="Consolas" panose="020B0609020204030204" pitchFamily="49" charset="0"/>
+              </a:rPr>
+              <a:t>&gt;",</a:t>
             </a:r>
           </a:p>
           <a:p>
@@ -4498,7 +4501,37 @@
                 <a:latin typeface="Consolas" panose="020B0609020204030204" pitchFamily="49" charset="0"/>
                 <a:cs typeface="Consolas" panose="020B0609020204030204" pitchFamily="49" charset="0"/>
               </a:rPr>
-              <a:t>": "/timesheets/dat-4035447427/submittal"</a:t>
+              <a:t>": "/timesheets/&lt;</a:t>
+            </a:r>
+            <a:r>
+              <a:rPr lang="en-US" dirty="0" err="1">
+                <a:ln>
+                  <a:solidFill>
+                    <a:srgbClr val="00B050"/>
+                  </a:solidFill>
+                </a:ln>
+                <a:solidFill>
+                  <a:srgbClr val="00B050"/>
+                </a:solidFill>
+                <a:latin typeface="Consolas" panose="020B0609020204030204" pitchFamily="49" charset="0"/>
+                <a:cs typeface="Consolas" panose="020B0609020204030204" pitchFamily="49" charset="0"/>
+              </a:rPr>
+              <a:t>guid</a:t>
+            </a:r>
+            <a:r>
+              <a:rPr lang="en-US" dirty="0">
+                <a:ln>
+                  <a:solidFill>
+                    <a:srgbClr val="00B050"/>
+                  </a:solidFill>
+                </a:ln>
+                <a:solidFill>
+                  <a:srgbClr val="00B050"/>
+                </a:solidFill>
+                <a:latin typeface="Consolas" panose="020B0609020204030204" pitchFamily="49" charset="0"/>
+                <a:cs typeface="Consolas" panose="020B0609020204030204" pitchFamily="49" charset="0"/>
+              </a:rPr>
+              <a:t>&gt;/submittal"</a:t>
             </a:r>
           </a:p>
           <a:p>
@@ -4708,7 +4741,37 @@
                 <a:latin typeface="Consolas" panose="020B0609020204030204" pitchFamily="49" charset="0"/>
                 <a:cs typeface="Consolas" panose="020B0609020204030204" pitchFamily="49" charset="0"/>
               </a:rPr>
-              <a:t>": "/timesheets/dat-4035447427/cancellation"</a:t>
+              <a:t>": "/timesheets/&lt;</a:t>
+            </a:r>
+            <a:r>
+              <a:rPr lang="en-US" dirty="0" err="1">
+                <a:ln>
+                  <a:solidFill>
+                    <a:srgbClr val="00B050"/>
+                  </a:solidFill>
+                </a:ln>
+                <a:solidFill>
+                  <a:srgbClr val="00B050"/>
+                </a:solidFill>
+                <a:latin typeface="Consolas" panose="020B0609020204030204" pitchFamily="49" charset="0"/>
+                <a:cs typeface="Consolas" panose="020B0609020204030204" pitchFamily="49" charset="0"/>
+              </a:rPr>
+              <a:t>guid</a:t>
+            </a:r>
+            <a:r>
+              <a:rPr lang="en-US" dirty="0">
+                <a:ln>
+                  <a:solidFill>
+                    <a:srgbClr val="00B050"/>
+                  </a:solidFill>
+                </a:ln>
+                <a:solidFill>
+                  <a:srgbClr val="00B050"/>
+                </a:solidFill>
+                <a:latin typeface="Consolas" panose="020B0609020204030204" pitchFamily="49" charset="0"/>
+                <a:cs typeface="Consolas" panose="020B0609020204030204" pitchFamily="49" charset="0"/>
+              </a:rPr>
+              <a:t>&gt;/cancellation"</a:t>
             </a:r>
           </a:p>
           <a:p>
@@ -5032,7 +5095,37 @@
                 <a:latin typeface="Consolas" panose="020B0609020204030204" pitchFamily="49" charset="0"/>
                 <a:cs typeface="Consolas" panose="020B0609020204030204" pitchFamily="49" charset="0"/>
               </a:rPr>
-              <a:t>": "/timesheets/dat-4035447427/transitions"</a:t>
+              <a:t>": "/timesheets/&lt;</a:t>
+            </a:r>
+            <a:r>
+              <a:rPr lang="en-US" dirty="0" err="1">
+                <a:ln>
+                  <a:solidFill>
+                    <a:srgbClr val="00B050"/>
+                  </a:solidFill>
+                </a:ln>
+                <a:solidFill>
+                  <a:srgbClr val="00B050"/>
+                </a:solidFill>
+                <a:latin typeface="Consolas" panose="020B0609020204030204" pitchFamily="49" charset="0"/>
+                <a:cs typeface="Consolas" panose="020B0609020204030204" pitchFamily="49" charset="0"/>
+              </a:rPr>
+              <a:t>guid</a:t>
+            </a:r>
+            <a:r>
+              <a:rPr lang="en-US" dirty="0">
+                <a:ln>
+                  <a:solidFill>
+                    <a:srgbClr val="00B050"/>
+                  </a:solidFill>
+                </a:ln>
+                <a:solidFill>
+                  <a:srgbClr val="00B050"/>
+                </a:solidFill>
+                <a:latin typeface="Consolas" panose="020B0609020204030204" pitchFamily="49" charset="0"/>
+                <a:cs typeface="Consolas" panose="020B0609020204030204" pitchFamily="49" charset="0"/>
+              </a:rPr>
+              <a:t>&gt;/transitions"</a:t>
             </a:r>
           </a:p>
           <a:p>
@@ -5242,7 +5335,37 @@
                 <a:latin typeface="Consolas" panose="020B0609020204030204" pitchFamily="49" charset="0"/>
                 <a:cs typeface="Consolas" panose="020B0609020204030204" pitchFamily="49" charset="0"/>
               </a:rPr>
-              <a:t>": "/timesheets/dat-4035447427/lines"</a:t>
+              <a:t>": "/timesheets/&lt;</a:t>
+            </a:r>
+            <a:r>
+              <a:rPr lang="en-US" dirty="0" err="1">
+                <a:ln>
+                  <a:solidFill>
+                    <a:srgbClr val="00B050"/>
+                  </a:solidFill>
+                </a:ln>
+                <a:solidFill>
+                  <a:srgbClr val="00B050"/>
+                </a:solidFill>
+                <a:latin typeface="Consolas" panose="020B0609020204030204" pitchFamily="49" charset="0"/>
+                <a:cs typeface="Consolas" panose="020B0609020204030204" pitchFamily="49" charset="0"/>
+              </a:rPr>
+              <a:t>guid</a:t>
+            </a:r>
+            <a:r>
+              <a:rPr lang="en-US" dirty="0">
+                <a:ln>
+                  <a:solidFill>
+                    <a:srgbClr val="00B050"/>
+                  </a:solidFill>
+                </a:ln>
+                <a:solidFill>
+                  <a:srgbClr val="00B050"/>
+                </a:solidFill>
+                <a:latin typeface="Consolas" panose="020B0609020204030204" pitchFamily="49" charset="0"/>
+                <a:cs typeface="Consolas" panose="020B0609020204030204" pitchFamily="49" charset="0"/>
+              </a:rPr>
+              <a:t>&gt;/lines"</a:t>
             </a:r>
           </a:p>
           <a:p>
@@ -9906,7 +10029,9 @@
         </p:nvSpPr>
         <p:spPr/>
         <p:txBody>
-          <a:bodyPr/>
+          <a:bodyPr>
+            <a:normAutofit fontScale="92500" lnSpcReduction="10000"/>
+          </a:bodyPr>
           <a:lstStyle/>
           <a:p>
             <a:pPr marL="0" indent="0">
@@ -9996,6 +10121,26 @@
               <a:rPr lang="en-US" dirty="0"/>
               <a:t>Add support to root document for creating a timesheet</a:t>
             </a:r>
+          </a:p>
+          <a:p>
+            <a:pPr marL="0" indent="0">
+              <a:buNone/>
+            </a:pPr>
+            <a:endParaRPr lang="en-US" dirty="0"/>
+          </a:p>
+          <a:p>
+            <a:pPr marL="0" indent="0">
+              <a:buNone/>
+            </a:pPr>
+            <a:r>
+              <a:rPr lang="en-US" dirty="0"/>
+              <a:t>There are a few extra things to try out in </a:t>
+            </a:r>
+            <a:r>
+              <a:rPr lang="en-US"/>
+              <a:t>the assignment’s README</a:t>
+            </a:r>
+            <a:endParaRPr lang="en-US" dirty="0"/>
           </a:p>
         </p:txBody>
       </p:sp>
@@ -11367,7 +11512,7 @@
                 <a:latin typeface="Consolas" panose="020B0609020204030204" pitchFamily="49" charset="0"/>
                 <a:cs typeface="Consolas" panose="020B0609020204030204" pitchFamily="49" charset="0"/>
               </a:rPr>
-              <a:t>{ resource: 1 }</a:t>
+              <a:t>{ employee: 1 }</a:t>
             </a:r>
           </a:p>
         </p:txBody>

</xml_diff>